<commit_message>
Chap04: Correction of picture and Biblio
</commit_message>
<xml_diff>
--- a/04-CrMagOpt/Pictures/CrCloseDot.pptx
+++ b/04-CrMagOpt/Pictures/CrCloseDot.pptx
@@ -288,7 +288,7 @@
           <a:p>
             <a:fld id="{80996800-4B7D-448A-BF1B-3F56F5598ECC}" type="datetimeFigureOut">
               <a:rPr lang="fr-FR" smtClean="0"/>
-              <a:t>31/10/2017</a:t>
+              <a:t>06/11/2017</a:t>
             </a:fld>
             <a:endParaRPr lang="fr-FR"/>
           </a:p>
@@ -458,7 +458,7 @@
           <a:p>
             <a:fld id="{80996800-4B7D-448A-BF1B-3F56F5598ECC}" type="datetimeFigureOut">
               <a:rPr lang="fr-FR" smtClean="0"/>
-              <a:t>31/10/2017</a:t>
+              <a:t>06/11/2017</a:t>
             </a:fld>
             <a:endParaRPr lang="fr-FR"/>
           </a:p>
@@ -638,7 +638,7 @@
           <a:p>
             <a:fld id="{80996800-4B7D-448A-BF1B-3F56F5598ECC}" type="datetimeFigureOut">
               <a:rPr lang="fr-FR" smtClean="0"/>
-              <a:t>31/10/2017</a:t>
+              <a:t>06/11/2017</a:t>
             </a:fld>
             <a:endParaRPr lang="fr-FR"/>
           </a:p>
@@ -808,7 +808,7 @@
           <a:p>
             <a:fld id="{80996800-4B7D-448A-BF1B-3F56F5598ECC}" type="datetimeFigureOut">
               <a:rPr lang="fr-FR" smtClean="0"/>
-              <a:t>31/10/2017</a:t>
+              <a:t>06/11/2017</a:t>
             </a:fld>
             <a:endParaRPr lang="fr-FR"/>
           </a:p>
@@ -1054,7 +1054,7 @@
           <a:p>
             <a:fld id="{80996800-4B7D-448A-BF1B-3F56F5598ECC}" type="datetimeFigureOut">
               <a:rPr lang="fr-FR" smtClean="0"/>
-              <a:t>31/10/2017</a:t>
+              <a:t>06/11/2017</a:t>
             </a:fld>
             <a:endParaRPr lang="fr-FR"/>
           </a:p>
@@ -1342,7 +1342,7 @@
           <a:p>
             <a:fld id="{80996800-4B7D-448A-BF1B-3F56F5598ECC}" type="datetimeFigureOut">
               <a:rPr lang="fr-FR" smtClean="0"/>
-              <a:t>31/10/2017</a:t>
+              <a:t>06/11/2017</a:t>
             </a:fld>
             <a:endParaRPr lang="fr-FR"/>
           </a:p>
@@ -1764,7 +1764,7 @@
           <a:p>
             <a:fld id="{80996800-4B7D-448A-BF1B-3F56F5598ECC}" type="datetimeFigureOut">
               <a:rPr lang="fr-FR" smtClean="0"/>
-              <a:t>31/10/2017</a:t>
+              <a:t>06/11/2017</a:t>
             </a:fld>
             <a:endParaRPr lang="fr-FR"/>
           </a:p>
@@ -1882,7 +1882,7 @@
           <a:p>
             <a:fld id="{80996800-4B7D-448A-BF1B-3F56F5598ECC}" type="datetimeFigureOut">
               <a:rPr lang="fr-FR" smtClean="0"/>
-              <a:t>31/10/2017</a:t>
+              <a:t>06/11/2017</a:t>
             </a:fld>
             <a:endParaRPr lang="fr-FR"/>
           </a:p>
@@ -1977,7 +1977,7 @@
           <a:p>
             <a:fld id="{80996800-4B7D-448A-BF1B-3F56F5598ECC}" type="datetimeFigureOut">
               <a:rPr lang="fr-FR" smtClean="0"/>
-              <a:t>31/10/2017</a:t>
+              <a:t>06/11/2017</a:t>
             </a:fld>
             <a:endParaRPr lang="fr-FR"/>
           </a:p>
@@ -2254,7 +2254,7 @@
           <a:p>
             <a:fld id="{80996800-4B7D-448A-BF1B-3F56F5598ECC}" type="datetimeFigureOut">
               <a:rPr lang="fr-FR" smtClean="0"/>
-              <a:t>31/10/2017</a:t>
+              <a:t>06/11/2017</a:t>
             </a:fld>
             <a:endParaRPr lang="fr-FR"/>
           </a:p>
@@ -2507,7 +2507,7 @@
           <a:p>
             <a:fld id="{80996800-4B7D-448A-BF1B-3F56F5598ECC}" type="datetimeFigureOut">
               <a:rPr lang="fr-FR" smtClean="0"/>
-              <a:t>31/10/2017</a:t>
+              <a:t>06/11/2017</a:t>
             </a:fld>
             <a:endParaRPr lang="fr-FR"/>
           </a:p>
@@ -2720,7 +2720,7 @@
           <a:p>
             <a:fld id="{80996800-4B7D-448A-BF1B-3F56F5598ECC}" type="datetimeFigureOut">
               <a:rPr lang="fr-FR" smtClean="0"/>
-              <a:t>31/10/2017</a:t>
+              <a:t>06/11/2017</a:t>
             </a:fld>
             <a:endParaRPr lang="fr-FR"/>
           </a:p>
@@ -3563,8 +3563,8 @@
         </p:nvSpPr>
         <p:spPr>
           <a:xfrm>
-            <a:off x="2936558" y="2044800"/>
-            <a:ext cx="915635" cy="369332"/>
+            <a:off x="3042000" y="2044800"/>
+            <a:ext cx="800219" cy="369332"/>
           </a:xfrm>
           <a:prstGeom prst="rect">
             <a:avLst/>
@@ -3582,7 +3582,7 @@
                 <a:latin typeface="Times New Roman" pitchFamily="18" charset="0"/>
                 <a:cs typeface="Times New Roman" pitchFamily="18" charset="0"/>
               </a:rPr>
-              <a:t>1.43 </a:t>
+              <a:t>1.2 </a:t>
             </a:r>
             <a:r>
               <a:rPr lang="fr-FR" dirty="0" smtClean="0">
@@ -3643,8 +3643,8 @@
         </p:nvSpPr>
         <p:spPr>
           <a:xfrm>
-            <a:off x="2937600" y="884255"/>
-            <a:ext cx="915635" cy="369332"/>
+            <a:off x="3042000" y="884255"/>
+            <a:ext cx="800219" cy="369332"/>
           </a:xfrm>
           <a:prstGeom prst="rect">
             <a:avLst/>
@@ -3662,7 +3662,7 @@
                 <a:latin typeface="Times New Roman" pitchFamily="18" charset="0"/>
                 <a:cs typeface="Times New Roman" pitchFamily="18" charset="0"/>
               </a:rPr>
-              <a:t>1.36 </a:t>
+              <a:t>1.0 </a:t>
             </a:r>
             <a:r>
               <a:rPr lang="fr-FR" dirty="0" smtClean="0">

</xml_diff>